<commit_message>
Add DANDI example notebooks
</commit_message>
<xml_diff>
--- a/docs/source/community_gallery/figures/figure_icons_source.pptx
+++ b/docs/source/community_gallery/figures/figure_icons_source.pptx
@@ -7,6 +7,7 @@
   <p:sldIdLst>
     <p:sldId id="260" r:id="rId2"/>
     <p:sldId id="261" r:id="rId3"/>
+    <p:sldId id="262" r:id="rId4"/>
   </p:sldIdLst>
   <p:sldSz cx="12192000" cy="6858000"/>
   <p:notesSz cx="6858000" cy="9144000"/>
@@ -3613,6 +3614,165 @@
 </p:sld>
 </file>
 
+<file path=ppt/slides/slide3.xml><?xml version="1.0" encoding="utf-8"?>
+<p:sld xmlns:a="http://schemas.openxmlformats.org/drawingml/2006/main" xmlns:r="http://schemas.openxmlformats.org/officeDocument/2006/relationships" xmlns:p="http://schemas.openxmlformats.org/presentationml/2006/main">
+  <p:cSld>
+    <p:spTree>
+      <p:nvGrpSpPr>
+        <p:cNvPr id="1" name=""/>
+        <p:cNvGrpSpPr/>
+        <p:nvPr/>
+      </p:nvGrpSpPr>
+      <p:grpSpPr>
+        <a:xfrm>
+          <a:off x="0" y="0"/>
+          <a:ext cx="0" cy="0"/>
+          <a:chOff x="0" y="0"/>
+          <a:chExt cx="0" cy="0"/>
+        </a:xfrm>
+      </p:grpSpPr>
+      <p:sp>
+        <p:nvSpPr>
+          <p:cNvPr id="4" name="Rounded Rectangle 3">
+            <a:extLst>
+              <a:ext uri="{FF2B5EF4-FFF2-40B4-BE49-F238E27FC236}">
+                <a16:creationId xmlns:a16="http://schemas.microsoft.com/office/drawing/2014/main" id="{F65B14FD-C8C7-2B3F-DF0C-AA9F6FF76009}"/>
+              </a:ext>
+            </a:extLst>
+          </p:cNvPr>
+          <p:cNvSpPr>
+            <a:spLocks noChangeAspect="1"/>
+          </p:cNvSpPr>
+          <p:nvPr/>
+        </p:nvSpPr>
+        <p:spPr>
+          <a:xfrm>
+            <a:off x="4267200" y="1521913"/>
+            <a:ext cx="3657600" cy="3657600"/>
+          </a:xfrm>
+          <a:prstGeom prst="roundRect">
+            <a:avLst/>
+          </a:prstGeom>
+          <a:solidFill>
+            <a:schemeClr val="bg1"/>
+          </a:solidFill>
+          <a:ln w="38100">
+            <a:solidFill>
+              <a:srgbClr val="0F4C7C"/>
+            </a:solidFill>
+          </a:ln>
+        </p:spPr>
+        <p:style>
+          <a:lnRef idx="2">
+            <a:schemeClr val="accent1">
+              <a:shade val="50000"/>
+            </a:schemeClr>
+          </a:lnRef>
+          <a:fillRef idx="1">
+            <a:schemeClr val="accent1"/>
+          </a:fillRef>
+          <a:effectRef idx="0">
+            <a:schemeClr val="accent1"/>
+          </a:effectRef>
+          <a:fontRef idx="minor">
+            <a:schemeClr val="lt1"/>
+          </a:fontRef>
+        </p:style>
+        <p:txBody>
+          <a:bodyPr rtlCol="0" anchor="ctr"/>
+          <a:lstStyle/>
+          <a:p>
+            <a:pPr algn="ctr"/>
+            <a:endParaRPr lang="en-US"/>
+          </a:p>
+        </p:txBody>
+      </p:sp>
+      <p:sp>
+        <p:nvSpPr>
+          <p:cNvPr id="2" name="TextBox 1">
+            <a:extLst>
+              <a:ext uri="{FF2B5EF4-FFF2-40B4-BE49-F238E27FC236}">
+                <a16:creationId xmlns:a16="http://schemas.microsoft.com/office/drawing/2014/main" id="{F2BA9F45-5BC6-B6CE-D768-144C78BB5FB1}"/>
+              </a:ext>
+            </a:extLst>
+          </p:cNvPr>
+          <p:cNvSpPr txBox="1"/>
+          <p:nvPr/>
+        </p:nvSpPr>
+        <p:spPr>
+          <a:xfrm>
+            <a:off x="4267200" y="3923651"/>
+            <a:ext cx="3657601" cy="1182022"/>
+          </a:xfrm>
+          <a:prstGeom prst="rect">
+            <a:avLst/>
+          </a:prstGeom>
+          <a:noFill/>
+          <a:effectLst/>
+        </p:spPr>
+        <p:txBody>
+          <a:bodyPr wrap="square" lIns="0" tIns="0" rIns="0" bIns="0" rtlCol="0">
+            <a:noAutofit/>
+          </a:bodyPr>
+          <a:lstStyle/>
+          <a:p>
+            <a:pPr algn="ctr"/>
+            <a:r>
+              <a:rPr lang="en-US" sz="4000" dirty="0">
+                <a:solidFill>
+                  <a:srgbClr val="0F4C7C"/>
+                </a:solidFill>
+                <a:ea typeface="Brush Script MT" panose="03060802040406070304" pitchFamily="66" charset="-122"/>
+                <a:cs typeface="Arial" panose="020B0604020202020204" pitchFamily="34" charset="0"/>
+              </a:rPr>
+              <a:t>DANDI Example Notebooks</a:t>
+            </a:r>
+          </a:p>
+        </p:txBody>
+      </p:sp>
+      <p:pic>
+        <p:nvPicPr>
+          <p:cNvPr id="5" name="Picture 4" descr="Text&#10;&#10;Description automatically generated">
+            <a:extLst>
+              <a:ext uri="{FF2B5EF4-FFF2-40B4-BE49-F238E27FC236}">
+                <a16:creationId xmlns:a16="http://schemas.microsoft.com/office/drawing/2014/main" id="{6043FA4A-B548-F7DB-E1E3-9CDA20F64C65}"/>
+              </a:ext>
+            </a:extLst>
+          </p:cNvPr>
+          <p:cNvPicPr>
+            <a:picLocks noChangeAspect="1"/>
+          </p:cNvPicPr>
+          <p:nvPr/>
+        </p:nvPicPr>
+        <p:blipFill>
+          <a:blip r:embed="rId2"/>
+          <a:stretch>
+            <a:fillRect/>
+          </a:stretch>
+        </p:blipFill>
+        <p:spPr>
+          <a:xfrm>
+            <a:off x="4391889" y="2094952"/>
+            <a:ext cx="3408221" cy="1255660"/>
+          </a:xfrm>
+          <a:prstGeom prst="rect">
+            <a:avLst/>
+          </a:prstGeom>
+        </p:spPr>
+      </p:pic>
+    </p:spTree>
+    <p:extLst>
+      <p:ext uri="{BB962C8B-B14F-4D97-AF65-F5344CB8AC3E}">
+        <p14:creationId xmlns:p14="http://schemas.microsoft.com/office/powerpoint/2010/main" val="675388816"/>
+      </p:ext>
+    </p:extLst>
+  </p:cSld>
+  <p:clrMapOvr>
+    <a:masterClrMapping/>
+  </p:clrMapOvr>
+</p:sld>
+</file>
+
 <file path=ppt/theme/theme1.xml><?xml version="1.0" encoding="utf-8"?>
 <a:theme xmlns:a="http://schemas.openxmlformats.org/drawingml/2006/main" name="Office Theme">
   <a:themeElements>

</xml_diff>

<commit_message>
Add OpenScope Databook to community gallery
</commit_message>
<xml_diff>
--- a/docs/source/community_gallery/figures/figure_icons_source.pptx
+++ b/docs/source/community_gallery/figures/figure_icons_source.pptx
@@ -8,6 +8,7 @@
     <p:sldId id="260" r:id="rId2"/>
     <p:sldId id="261" r:id="rId3"/>
     <p:sldId id="262" r:id="rId4"/>
+    <p:sldId id="263" r:id="rId5"/>
   </p:sldIdLst>
   <p:sldSz cx="12192000" cy="6858000"/>
   <p:notesSz cx="6858000" cy="9144000"/>
@@ -272,7 +273,7 @@
           <a:p>
             <a:fld id="{9777CE0B-FDD2-AE4F-949E-C253776A1713}" type="datetimeFigureOut">
               <a:rPr lang="en-US" smtClean="0"/>
-              <a:t>3/8/23</a:t>
+              <a:t>3/9/23</a:t>
             </a:fld>
             <a:endParaRPr lang="en-US"/>
           </a:p>
@@ -470,7 +471,7 @@
           <a:p>
             <a:fld id="{9777CE0B-FDD2-AE4F-949E-C253776A1713}" type="datetimeFigureOut">
               <a:rPr lang="en-US" smtClean="0"/>
-              <a:t>3/8/23</a:t>
+              <a:t>3/9/23</a:t>
             </a:fld>
             <a:endParaRPr lang="en-US"/>
           </a:p>
@@ -678,7 +679,7 @@
           <a:p>
             <a:fld id="{9777CE0B-FDD2-AE4F-949E-C253776A1713}" type="datetimeFigureOut">
               <a:rPr lang="en-US" smtClean="0"/>
-              <a:t>3/8/23</a:t>
+              <a:t>3/9/23</a:t>
             </a:fld>
             <a:endParaRPr lang="en-US"/>
           </a:p>
@@ -876,7 +877,7 @@
           <a:p>
             <a:fld id="{9777CE0B-FDD2-AE4F-949E-C253776A1713}" type="datetimeFigureOut">
               <a:rPr lang="en-US" smtClean="0"/>
-              <a:t>3/8/23</a:t>
+              <a:t>3/9/23</a:t>
             </a:fld>
             <a:endParaRPr lang="en-US"/>
           </a:p>
@@ -1151,7 +1152,7 @@
           <a:p>
             <a:fld id="{9777CE0B-FDD2-AE4F-949E-C253776A1713}" type="datetimeFigureOut">
               <a:rPr lang="en-US" smtClean="0"/>
-              <a:t>3/8/23</a:t>
+              <a:t>3/9/23</a:t>
             </a:fld>
             <a:endParaRPr lang="en-US"/>
           </a:p>
@@ -1416,7 +1417,7 @@
           <a:p>
             <a:fld id="{9777CE0B-FDD2-AE4F-949E-C253776A1713}" type="datetimeFigureOut">
               <a:rPr lang="en-US" smtClean="0"/>
-              <a:t>3/8/23</a:t>
+              <a:t>3/9/23</a:t>
             </a:fld>
             <a:endParaRPr lang="en-US"/>
           </a:p>
@@ -1828,7 +1829,7 @@
           <a:p>
             <a:fld id="{9777CE0B-FDD2-AE4F-949E-C253776A1713}" type="datetimeFigureOut">
               <a:rPr lang="en-US" smtClean="0"/>
-              <a:t>3/8/23</a:t>
+              <a:t>3/9/23</a:t>
             </a:fld>
             <a:endParaRPr lang="en-US"/>
           </a:p>
@@ -1969,7 +1970,7 @@
           <a:p>
             <a:fld id="{9777CE0B-FDD2-AE4F-949E-C253776A1713}" type="datetimeFigureOut">
               <a:rPr lang="en-US" smtClean="0"/>
-              <a:t>3/8/23</a:t>
+              <a:t>3/9/23</a:t>
             </a:fld>
             <a:endParaRPr lang="en-US"/>
           </a:p>
@@ -2082,7 +2083,7 @@
           <a:p>
             <a:fld id="{9777CE0B-FDD2-AE4F-949E-C253776A1713}" type="datetimeFigureOut">
               <a:rPr lang="en-US" smtClean="0"/>
-              <a:t>3/8/23</a:t>
+              <a:t>3/9/23</a:t>
             </a:fld>
             <a:endParaRPr lang="en-US"/>
           </a:p>
@@ -2393,7 +2394,7 @@
           <a:p>
             <a:fld id="{9777CE0B-FDD2-AE4F-949E-C253776A1713}" type="datetimeFigureOut">
               <a:rPr lang="en-US" smtClean="0"/>
-              <a:t>3/8/23</a:t>
+              <a:t>3/9/23</a:t>
             </a:fld>
             <a:endParaRPr lang="en-US"/>
           </a:p>
@@ -2681,7 +2682,7 @@
           <a:p>
             <a:fld id="{9777CE0B-FDD2-AE4F-949E-C253776A1713}" type="datetimeFigureOut">
               <a:rPr lang="en-US" smtClean="0"/>
-              <a:t>3/8/23</a:t>
+              <a:t>3/9/23</a:t>
             </a:fld>
             <a:endParaRPr lang="en-US"/>
           </a:p>
@@ -2922,7 +2923,7 @@
           <a:p>
             <a:fld id="{9777CE0B-FDD2-AE4F-949E-C253776A1713}" type="datetimeFigureOut">
               <a:rPr lang="en-US" smtClean="0"/>
-              <a:t>3/8/23</a:t>
+              <a:t>3/9/23</a:t>
             </a:fld>
             <a:endParaRPr lang="en-US"/>
           </a:p>
@@ -3773,6 +3774,239 @@
 </p:sld>
 </file>
 
+<file path=ppt/slides/slide4.xml><?xml version="1.0" encoding="utf-8"?>
+<p:sld xmlns:a="http://schemas.openxmlformats.org/drawingml/2006/main" xmlns:r="http://schemas.openxmlformats.org/officeDocument/2006/relationships" xmlns:p="http://schemas.openxmlformats.org/presentationml/2006/main">
+  <p:cSld>
+    <p:spTree>
+      <p:nvGrpSpPr>
+        <p:cNvPr id="1" name=""/>
+        <p:cNvGrpSpPr/>
+        <p:nvPr/>
+      </p:nvGrpSpPr>
+      <p:grpSpPr>
+        <a:xfrm>
+          <a:off x="0" y="0"/>
+          <a:ext cx="0" cy="0"/>
+          <a:chOff x="0" y="0"/>
+          <a:chExt cx="0" cy="0"/>
+        </a:xfrm>
+      </p:grpSpPr>
+      <p:sp>
+        <p:nvSpPr>
+          <p:cNvPr id="4" name="Rounded Rectangle 3">
+            <a:extLst>
+              <a:ext uri="{FF2B5EF4-FFF2-40B4-BE49-F238E27FC236}">
+                <a16:creationId xmlns:a16="http://schemas.microsoft.com/office/drawing/2014/main" id="{F65B14FD-C8C7-2B3F-DF0C-AA9F6FF76009}"/>
+              </a:ext>
+            </a:extLst>
+          </p:cNvPr>
+          <p:cNvSpPr>
+            <a:spLocks noChangeAspect="1"/>
+          </p:cNvSpPr>
+          <p:nvPr/>
+        </p:nvSpPr>
+        <p:spPr>
+          <a:xfrm>
+            <a:off x="4267200" y="1521913"/>
+            <a:ext cx="3657600" cy="3657600"/>
+          </a:xfrm>
+          <a:prstGeom prst="roundRect">
+            <a:avLst/>
+          </a:prstGeom>
+          <a:solidFill>
+            <a:schemeClr val="bg1"/>
+          </a:solidFill>
+          <a:ln w="38100">
+            <a:solidFill>
+              <a:srgbClr val="0F4C7C"/>
+            </a:solidFill>
+          </a:ln>
+        </p:spPr>
+        <p:style>
+          <a:lnRef idx="2">
+            <a:schemeClr val="accent1">
+              <a:shade val="50000"/>
+            </a:schemeClr>
+          </a:lnRef>
+          <a:fillRef idx="1">
+            <a:schemeClr val="accent1"/>
+          </a:fillRef>
+          <a:effectRef idx="0">
+            <a:schemeClr val="accent1"/>
+          </a:effectRef>
+          <a:fontRef idx="minor">
+            <a:schemeClr val="lt1"/>
+          </a:fontRef>
+        </p:style>
+        <p:txBody>
+          <a:bodyPr rtlCol="0" anchor="ctr"/>
+          <a:lstStyle/>
+          <a:p>
+            <a:pPr algn="ctr"/>
+            <a:endParaRPr lang="en-US"/>
+          </a:p>
+        </p:txBody>
+      </p:sp>
+      <p:sp>
+        <p:nvSpPr>
+          <p:cNvPr id="2" name="TextBox 1">
+            <a:extLst>
+              <a:ext uri="{FF2B5EF4-FFF2-40B4-BE49-F238E27FC236}">
+                <a16:creationId xmlns:a16="http://schemas.microsoft.com/office/drawing/2014/main" id="{F2BA9F45-5BC6-B6CE-D768-144C78BB5FB1}"/>
+              </a:ext>
+            </a:extLst>
+          </p:cNvPr>
+          <p:cNvSpPr txBox="1"/>
+          <p:nvPr/>
+        </p:nvSpPr>
+        <p:spPr>
+          <a:xfrm>
+            <a:off x="4267200" y="3923651"/>
+            <a:ext cx="3657601" cy="1182022"/>
+          </a:xfrm>
+          <a:prstGeom prst="rect">
+            <a:avLst/>
+          </a:prstGeom>
+          <a:noFill/>
+          <a:effectLst/>
+        </p:spPr>
+        <p:txBody>
+          <a:bodyPr wrap="square" lIns="0" tIns="0" rIns="0" bIns="0" rtlCol="0">
+            <a:noAutofit/>
+          </a:bodyPr>
+          <a:lstStyle/>
+          <a:p>
+            <a:pPr algn="ctr"/>
+            <a:r>
+              <a:rPr lang="en-US" sz="4000" dirty="0" err="1">
+                <a:solidFill>
+                  <a:srgbClr val="0F4C7C"/>
+                </a:solidFill>
+                <a:ea typeface="Brush Script MT" panose="03060802040406070304" pitchFamily="66" charset="-122"/>
+                <a:cs typeface="Arial" panose="020B0604020202020204" pitchFamily="34" charset="0"/>
+              </a:rPr>
+              <a:t>OpenScope</a:t>
+            </a:r>
+            <a:r>
+              <a:rPr lang="en-US" sz="4000" dirty="0">
+                <a:solidFill>
+                  <a:srgbClr val="0F4C7C"/>
+                </a:solidFill>
+                <a:ea typeface="Brush Script MT" panose="03060802040406070304" pitchFamily="66" charset="-122"/>
+                <a:cs typeface="Arial" panose="020B0604020202020204" pitchFamily="34" charset="0"/>
+              </a:rPr>
+              <a:t> Databook</a:t>
+            </a:r>
+          </a:p>
+        </p:txBody>
+      </p:sp>
+      <p:pic>
+        <p:nvPicPr>
+          <p:cNvPr id="1026" name="Picture 2" descr="logo">
+            <a:extLst>
+              <a:ext uri="{FF2B5EF4-FFF2-40B4-BE49-F238E27FC236}">
+                <a16:creationId xmlns:a16="http://schemas.microsoft.com/office/drawing/2014/main" id="{D45265DA-24BB-AA23-A62C-9F802552CEA9}"/>
+              </a:ext>
+            </a:extLst>
+          </p:cNvPr>
+          <p:cNvPicPr>
+            <a:picLocks noChangeAspect="1" noChangeArrowheads="1"/>
+          </p:cNvPicPr>
+          <p:nvPr/>
+        </p:nvPicPr>
+        <p:blipFill>
+          <a:blip r:embed="rId2">
+            <a:extLst>
+              <a:ext uri="{28A0092B-C50C-407E-A947-70E740481C1C}">
+                <a14:useLocalDpi xmlns:a14="http://schemas.microsoft.com/office/drawing/2010/main" val="0"/>
+              </a:ext>
+            </a:extLst>
+          </a:blip>
+          <a:srcRect/>
+          <a:stretch>
+            <a:fillRect/>
+          </a:stretch>
+        </p:blipFill>
+        <p:spPr bwMode="auto">
+          <a:xfrm>
+            <a:off x="4556109" y="1678487"/>
+            <a:ext cx="3079782" cy="631355"/>
+          </a:xfrm>
+          <a:prstGeom prst="rect">
+            <a:avLst/>
+          </a:prstGeom>
+          <a:noFill/>
+          <a:extLst>
+            <a:ext uri="{909E8E84-426E-40DD-AFC4-6F175D3DCCD1}">
+              <a14:hiddenFill xmlns:a14="http://schemas.microsoft.com/office/drawing/2010/main">
+                <a:solidFill>
+                  <a:srgbClr val="FFFFFF"/>
+                </a:solidFill>
+              </a14:hiddenFill>
+            </a:ext>
+          </a:extLst>
+        </p:spPr>
+      </p:pic>
+      <p:pic>
+        <p:nvPicPr>
+          <p:cNvPr id="1028" name="Picture 4" descr="artwork">
+            <a:extLst>
+              <a:ext uri="{FF2B5EF4-FFF2-40B4-BE49-F238E27FC236}">
+                <a16:creationId xmlns:a16="http://schemas.microsoft.com/office/drawing/2014/main" id="{C33E1747-48A3-30F4-16D1-D78B96033467}"/>
+              </a:ext>
+            </a:extLst>
+          </p:cNvPr>
+          <p:cNvPicPr>
+            <a:picLocks noChangeAspect="1" noChangeArrowheads="1"/>
+          </p:cNvPicPr>
+          <p:nvPr/>
+        </p:nvPicPr>
+        <p:blipFill>
+          <a:blip r:embed="rId3">
+            <a:extLst>
+              <a:ext uri="{28A0092B-C50C-407E-A947-70E740481C1C}">
+                <a14:useLocalDpi xmlns:a14="http://schemas.microsoft.com/office/drawing/2010/main" val="0"/>
+              </a:ext>
+            </a:extLst>
+          </a:blip>
+          <a:srcRect/>
+          <a:stretch>
+            <a:fillRect/>
+          </a:stretch>
+        </p:blipFill>
+        <p:spPr bwMode="auto">
+          <a:xfrm>
+            <a:off x="5092314" y="2371075"/>
+            <a:ext cx="2007371" cy="1552576"/>
+          </a:xfrm>
+          <a:prstGeom prst="rect">
+            <a:avLst/>
+          </a:prstGeom>
+          <a:noFill/>
+          <a:extLst>
+            <a:ext uri="{909E8E84-426E-40DD-AFC4-6F175D3DCCD1}">
+              <a14:hiddenFill xmlns:a14="http://schemas.microsoft.com/office/drawing/2010/main">
+                <a:solidFill>
+                  <a:srgbClr val="FFFFFF"/>
+                </a:solidFill>
+              </a14:hiddenFill>
+            </a:ext>
+          </a:extLst>
+        </p:spPr>
+      </p:pic>
+    </p:spTree>
+    <p:extLst>
+      <p:ext uri="{BB962C8B-B14F-4D97-AF65-F5344CB8AC3E}">
+        <p14:creationId xmlns:p14="http://schemas.microsoft.com/office/powerpoint/2010/main" val="1222717535"/>
+      </p:ext>
+    </p:extLst>
+  </p:cSld>
+  <p:clrMapOvr>
+    <a:masterClrMapping/>
+  </p:clrMapOvr>
+</p:sld>
+</file>
+
 <file path=ppt/theme/theme1.xml><?xml version="1.0" encoding="utf-8"?>
 <a:theme xmlns:a="http://schemas.openxmlformats.org/drawingml/2006/main" name="Office Theme">
   <a:themeElements>

</xml_diff>

<commit_message>
Fix #86  Add IBL Brainmap tutorial to the community gallery
</commit_message>
<xml_diff>
--- a/docs/source/community_gallery/figures/figure_icons_source.pptx
+++ b/docs/source/community_gallery/figures/figure_icons_source.pptx
@@ -9,6 +9,7 @@
     <p:sldId id="261" r:id="rId3"/>
     <p:sldId id="262" r:id="rId4"/>
     <p:sldId id="263" r:id="rId5"/>
+    <p:sldId id="264" r:id="rId6"/>
   </p:sldIdLst>
   <p:sldSz cx="12192000" cy="6858000"/>
   <p:notesSz cx="6858000" cy="9144000"/>
@@ -273,7 +274,7 @@
           <a:p>
             <a:fld id="{9777CE0B-FDD2-AE4F-949E-C253776A1713}" type="datetimeFigureOut">
               <a:rPr lang="en-US" smtClean="0"/>
-              <a:t>3/9/23</a:t>
+              <a:t>7/18/23</a:t>
             </a:fld>
             <a:endParaRPr lang="en-US"/>
           </a:p>
@@ -471,7 +472,7 @@
           <a:p>
             <a:fld id="{9777CE0B-FDD2-AE4F-949E-C253776A1713}" type="datetimeFigureOut">
               <a:rPr lang="en-US" smtClean="0"/>
-              <a:t>3/9/23</a:t>
+              <a:t>7/18/23</a:t>
             </a:fld>
             <a:endParaRPr lang="en-US"/>
           </a:p>
@@ -679,7 +680,7 @@
           <a:p>
             <a:fld id="{9777CE0B-FDD2-AE4F-949E-C253776A1713}" type="datetimeFigureOut">
               <a:rPr lang="en-US" smtClean="0"/>
-              <a:t>3/9/23</a:t>
+              <a:t>7/18/23</a:t>
             </a:fld>
             <a:endParaRPr lang="en-US"/>
           </a:p>
@@ -877,7 +878,7 @@
           <a:p>
             <a:fld id="{9777CE0B-FDD2-AE4F-949E-C253776A1713}" type="datetimeFigureOut">
               <a:rPr lang="en-US" smtClean="0"/>
-              <a:t>3/9/23</a:t>
+              <a:t>7/18/23</a:t>
             </a:fld>
             <a:endParaRPr lang="en-US"/>
           </a:p>
@@ -1152,7 +1153,7 @@
           <a:p>
             <a:fld id="{9777CE0B-FDD2-AE4F-949E-C253776A1713}" type="datetimeFigureOut">
               <a:rPr lang="en-US" smtClean="0"/>
-              <a:t>3/9/23</a:t>
+              <a:t>7/18/23</a:t>
             </a:fld>
             <a:endParaRPr lang="en-US"/>
           </a:p>
@@ -1417,7 +1418,7 @@
           <a:p>
             <a:fld id="{9777CE0B-FDD2-AE4F-949E-C253776A1713}" type="datetimeFigureOut">
               <a:rPr lang="en-US" smtClean="0"/>
-              <a:t>3/9/23</a:t>
+              <a:t>7/18/23</a:t>
             </a:fld>
             <a:endParaRPr lang="en-US"/>
           </a:p>
@@ -1829,7 +1830,7 @@
           <a:p>
             <a:fld id="{9777CE0B-FDD2-AE4F-949E-C253776A1713}" type="datetimeFigureOut">
               <a:rPr lang="en-US" smtClean="0"/>
-              <a:t>3/9/23</a:t>
+              <a:t>7/18/23</a:t>
             </a:fld>
             <a:endParaRPr lang="en-US"/>
           </a:p>
@@ -1970,7 +1971,7 @@
           <a:p>
             <a:fld id="{9777CE0B-FDD2-AE4F-949E-C253776A1713}" type="datetimeFigureOut">
               <a:rPr lang="en-US" smtClean="0"/>
-              <a:t>3/9/23</a:t>
+              <a:t>7/18/23</a:t>
             </a:fld>
             <a:endParaRPr lang="en-US"/>
           </a:p>
@@ -2083,7 +2084,7 @@
           <a:p>
             <a:fld id="{9777CE0B-FDD2-AE4F-949E-C253776A1713}" type="datetimeFigureOut">
               <a:rPr lang="en-US" smtClean="0"/>
-              <a:t>3/9/23</a:t>
+              <a:t>7/18/23</a:t>
             </a:fld>
             <a:endParaRPr lang="en-US"/>
           </a:p>
@@ -2394,7 +2395,7 @@
           <a:p>
             <a:fld id="{9777CE0B-FDD2-AE4F-949E-C253776A1713}" type="datetimeFigureOut">
               <a:rPr lang="en-US" smtClean="0"/>
-              <a:t>3/9/23</a:t>
+              <a:t>7/18/23</a:t>
             </a:fld>
             <a:endParaRPr lang="en-US"/>
           </a:p>
@@ -2682,7 +2683,7 @@
           <a:p>
             <a:fld id="{9777CE0B-FDD2-AE4F-949E-C253776A1713}" type="datetimeFigureOut">
               <a:rPr lang="en-US" smtClean="0"/>
-              <a:t>3/9/23</a:t>
+              <a:t>7/18/23</a:t>
             </a:fld>
             <a:endParaRPr lang="en-US"/>
           </a:p>
@@ -2923,7 +2924,7 @@
           <a:p>
             <a:fld id="{9777CE0B-FDD2-AE4F-949E-C253776A1713}" type="datetimeFigureOut">
               <a:rPr lang="en-US" smtClean="0"/>
-              <a:t>3/9/23</a:t>
+              <a:t>7/18/23</a:t>
             </a:fld>
             <a:endParaRPr lang="en-US"/>
           </a:p>
@@ -4007,6 +4008,210 @@
 </p:sld>
 </file>
 
+<file path=ppt/slides/slide5.xml><?xml version="1.0" encoding="utf-8"?>
+<p:sld xmlns:a="http://schemas.openxmlformats.org/drawingml/2006/main" xmlns:r="http://schemas.openxmlformats.org/officeDocument/2006/relationships" xmlns:p="http://schemas.openxmlformats.org/presentationml/2006/main">
+  <p:cSld>
+    <p:spTree>
+      <p:nvGrpSpPr>
+        <p:cNvPr id="1" name=""/>
+        <p:cNvGrpSpPr/>
+        <p:nvPr/>
+      </p:nvGrpSpPr>
+      <p:grpSpPr>
+        <a:xfrm>
+          <a:off x="0" y="0"/>
+          <a:ext cx="0" cy="0"/>
+          <a:chOff x="0" y="0"/>
+          <a:chExt cx="0" cy="0"/>
+        </a:xfrm>
+      </p:grpSpPr>
+      <p:sp>
+        <p:nvSpPr>
+          <p:cNvPr id="4" name="Rounded Rectangle 3">
+            <a:extLst>
+              <a:ext uri="{FF2B5EF4-FFF2-40B4-BE49-F238E27FC236}">
+                <a16:creationId xmlns:a16="http://schemas.microsoft.com/office/drawing/2014/main" id="{F65B14FD-C8C7-2B3F-DF0C-AA9F6FF76009}"/>
+              </a:ext>
+            </a:extLst>
+          </p:cNvPr>
+          <p:cNvSpPr>
+            <a:spLocks noChangeAspect="1"/>
+          </p:cNvSpPr>
+          <p:nvPr/>
+        </p:nvSpPr>
+        <p:spPr>
+          <a:xfrm>
+            <a:off x="4267200" y="1521913"/>
+            <a:ext cx="3657600" cy="3657600"/>
+          </a:xfrm>
+          <a:prstGeom prst="roundRect">
+            <a:avLst/>
+          </a:prstGeom>
+          <a:solidFill>
+            <a:schemeClr val="bg1"/>
+          </a:solidFill>
+          <a:ln w="38100">
+            <a:solidFill>
+              <a:srgbClr val="0F4C7C"/>
+            </a:solidFill>
+          </a:ln>
+        </p:spPr>
+        <p:style>
+          <a:lnRef idx="2">
+            <a:schemeClr val="accent1">
+              <a:shade val="50000"/>
+            </a:schemeClr>
+          </a:lnRef>
+          <a:fillRef idx="1">
+            <a:schemeClr val="accent1"/>
+          </a:fillRef>
+          <a:effectRef idx="0">
+            <a:schemeClr val="accent1"/>
+          </a:effectRef>
+          <a:fontRef idx="minor">
+            <a:schemeClr val="lt1"/>
+          </a:fontRef>
+        </p:style>
+        <p:txBody>
+          <a:bodyPr rtlCol="0" anchor="ctr"/>
+          <a:lstStyle/>
+          <a:p>
+            <a:pPr algn="ctr"/>
+            <a:endParaRPr lang="en-US"/>
+          </a:p>
+        </p:txBody>
+      </p:sp>
+      <p:sp>
+        <p:nvSpPr>
+          <p:cNvPr id="2" name="TextBox 1">
+            <a:extLst>
+              <a:ext uri="{FF2B5EF4-FFF2-40B4-BE49-F238E27FC236}">
+                <a16:creationId xmlns:a16="http://schemas.microsoft.com/office/drawing/2014/main" id="{F2BA9F45-5BC6-B6CE-D768-144C78BB5FB1}"/>
+              </a:ext>
+            </a:extLst>
+          </p:cNvPr>
+          <p:cNvSpPr txBox="1"/>
+          <p:nvPr/>
+        </p:nvSpPr>
+        <p:spPr>
+          <a:xfrm>
+            <a:off x="4267200" y="3401135"/>
+            <a:ext cx="3657601" cy="1182022"/>
+          </a:xfrm>
+          <a:prstGeom prst="rect">
+            <a:avLst/>
+          </a:prstGeom>
+          <a:noFill/>
+          <a:effectLst/>
+        </p:spPr>
+        <p:txBody>
+          <a:bodyPr wrap="square" lIns="0" tIns="0" rIns="0" bIns="0" rtlCol="0">
+            <a:noAutofit/>
+          </a:bodyPr>
+          <a:lstStyle/>
+          <a:p>
+            <a:pPr algn="ctr"/>
+            <a:r>
+              <a:rPr lang="en-US" sz="4000" dirty="0">
+                <a:solidFill>
+                  <a:srgbClr val="0F4C7C"/>
+                </a:solidFill>
+                <a:ea typeface="Brush Script MT" panose="03060802040406070304" pitchFamily="66" charset="-122"/>
+                <a:cs typeface="Arial" panose="020B0604020202020204" pitchFamily="34" charset="0"/>
+              </a:rPr>
+              <a:t>IBL </a:t>
+            </a:r>
+            <a:r>
+              <a:rPr lang="en-US" sz="4000" dirty="0" err="1">
+                <a:solidFill>
+                  <a:srgbClr val="0F4C7C"/>
+                </a:solidFill>
+                <a:ea typeface="Brush Script MT" panose="03060802040406070304" pitchFamily="66" charset="-122"/>
+                <a:cs typeface="Arial" panose="020B0604020202020204" pitchFamily="34" charset="0"/>
+              </a:rPr>
+              <a:t>Brainwide</a:t>
+            </a:r>
+            <a:r>
+              <a:rPr lang="en-US" sz="4000" dirty="0">
+                <a:solidFill>
+                  <a:srgbClr val="0F4C7C"/>
+                </a:solidFill>
+                <a:ea typeface="Brush Script MT" panose="03060802040406070304" pitchFamily="66" charset="-122"/>
+                <a:cs typeface="Arial" panose="020B0604020202020204" pitchFamily="34" charset="0"/>
+              </a:rPr>
+              <a:t> Map Dataset Tutorial</a:t>
+            </a:r>
+          </a:p>
+          <a:p>
+            <a:pPr algn="ctr"/>
+            <a:endParaRPr lang="en-US" sz="4000" dirty="0">
+              <a:solidFill>
+                <a:srgbClr val="0F4C7C"/>
+              </a:solidFill>
+              <a:ea typeface="Brush Script MT" panose="03060802040406070304" pitchFamily="66" charset="-122"/>
+              <a:cs typeface="Arial" panose="020B0604020202020204" pitchFamily="34" charset="0"/>
+            </a:endParaRPr>
+          </a:p>
+        </p:txBody>
+      </p:sp>
+      <p:pic>
+        <p:nvPicPr>
+          <p:cNvPr id="1026" name="Picture 2" descr="International Brain Laboratory">
+            <a:extLst>
+              <a:ext uri="{FF2B5EF4-FFF2-40B4-BE49-F238E27FC236}">
+                <a16:creationId xmlns:a16="http://schemas.microsoft.com/office/drawing/2014/main" id="{625A23F5-6738-9CE7-C5DB-1779BA0E5B14}"/>
+              </a:ext>
+            </a:extLst>
+          </p:cNvPr>
+          <p:cNvPicPr>
+            <a:picLocks noChangeAspect="1" noChangeArrowheads="1"/>
+          </p:cNvPicPr>
+          <p:nvPr/>
+        </p:nvPicPr>
+        <p:blipFill rotWithShape="1">
+          <a:blip r:embed="rId2">
+            <a:extLst>
+              <a:ext uri="{28A0092B-C50C-407E-A947-70E740481C1C}">
+                <a14:useLocalDpi xmlns:a14="http://schemas.microsoft.com/office/drawing/2010/main" val="0"/>
+              </a:ext>
+            </a:extLst>
+          </a:blip>
+          <a:srcRect l="2682" r="2682"/>
+          <a:stretch/>
+        </p:blipFill>
+        <p:spPr bwMode="auto">
+          <a:xfrm>
+            <a:off x="4267199" y="1676048"/>
+            <a:ext cx="3657600" cy="1587227"/>
+          </a:xfrm>
+          <a:prstGeom prst="rect">
+            <a:avLst/>
+          </a:prstGeom>
+          <a:noFill/>
+          <a:extLst>
+            <a:ext uri="{909E8E84-426E-40DD-AFC4-6F175D3DCCD1}">
+              <a14:hiddenFill xmlns:a14="http://schemas.microsoft.com/office/drawing/2010/main">
+                <a:solidFill>
+                  <a:srgbClr val="FFFFFF"/>
+                </a:solidFill>
+              </a14:hiddenFill>
+            </a:ext>
+          </a:extLst>
+        </p:spPr>
+      </p:pic>
+    </p:spTree>
+    <p:extLst>
+      <p:ext uri="{BB962C8B-B14F-4D97-AF65-F5344CB8AC3E}">
+        <p14:creationId xmlns:p14="http://schemas.microsoft.com/office/powerpoint/2010/main" val="2726053703"/>
+      </p:ext>
+    </p:extLst>
+  </p:cSld>
+  <p:clrMapOvr>
+    <a:masterClrMapping/>
+  </p:clrMapOvr>
+</p:sld>
+</file>
+
 <file path=ppt/theme/theme1.xml><?xml version="1.0" encoding="utf-8"?>
 <a:theme xmlns:a="http://schemas.openxmlformats.org/drawingml/2006/main" name="Office Theme">
   <a:themeElements>

</xml_diff>

<commit_message>
Update ibl brainmap figure
</commit_message>
<xml_diff>
--- a/docs/source/community_gallery/figures/figure_icons_source.pptx
+++ b/docs/source/community_gallery/figures/figure_icons_source.pptx
@@ -4095,7 +4095,7 @@
         </p:nvSpPr>
         <p:spPr>
           <a:xfrm>
-            <a:off x="4267200" y="3401135"/>
+            <a:off x="4267200" y="3335819"/>
             <a:ext cx="3657601" cy="1182022"/>
           </a:xfrm>
           <a:prstGeom prst="rect">
@@ -4141,16 +4141,6 @@
               </a:rPr>
               <a:t> Map Dataset Tutorial</a:t>
             </a:r>
-          </a:p>
-          <a:p>
-            <a:pPr algn="ctr"/>
-            <a:endParaRPr lang="en-US" sz="4000" dirty="0">
-              <a:solidFill>
-                <a:srgbClr val="0F4C7C"/>
-              </a:solidFill>
-              <a:ea typeface="Brush Script MT" panose="03060802040406070304" pitchFamily="66" charset="-122"/>
-              <a:cs typeface="Arial" panose="020B0604020202020204" pitchFamily="34" charset="0"/>
-            </a:endParaRPr>
           </a:p>
         </p:txBody>
       </p:sp>

</xml_diff>